<commit_message>
Added some notes to the powerpoint and presentation
</commit_message>
<xml_diff>
--- a/Grid.pptx
+++ b/Grid.pptx
@@ -5,7 +5,7 @@
     <p:sldMasterId id="2147483648" r:id="rId1"/>
   </p:sldMasterIdLst>
   <p:notesMasterIdLst>
-    <p:notesMasterId r:id="rId9"/>
+    <p:notesMasterId r:id="rId10"/>
   </p:notesMasterIdLst>
   <p:sldIdLst>
     <p:sldId id="256" r:id="rId2"/>
@@ -15,6 +15,7 @@
     <p:sldId id="264" r:id="rId6"/>
     <p:sldId id="262" r:id="rId7"/>
     <p:sldId id="260" r:id="rId8"/>
+    <p:sldId id="266" r:id="rId9"/>
   </p:sldIdLst>
   <p:sldSz cx="12192000" cy="6858000"/>
   <p:notesSz cx="6858000" cy="9144000"/>
@@ -203,7 +204,7 @@
           <a:p>
             <a:fld id="{3D2B48DD-5806-E040-BB46-CF7EF7496337}" type="datetimeFigureOut">
               <a:rPr lang="en-US" smtClean="0"/>
-              <a:t>6/5/2018</a:t>
+              <a:t>6/6/2018</a:t>
             </a:fld>
             <a:endParaRPr lang="en-US"/>
           </a:p>
@@ -1329,12 +1330,6 @@
           <a:p>
             <a:r>
               <a:rPr lang="en-US" dirty="0"/>
-              <a:t>http://www.agreatdaytocode.com/flexbox-froggy/</a:t>
-            </a:r>
-          </a:p>
-          <a:p>
-            <a:r>
-              <a:rPr lang="en-US" dirty="0"/>
               <a:t>https://programmingmentor.com/post/playing-css-grid-garden/</a:t>
             </a:r>
           </a:p>
@@ -1353,17 +1348,6 @@
             <a:endParaRPr lang="en-US" dirty="0"/>
           </a:p>
           <a:p>
-            <a:endParaRPr lang="en-US" dirty="0"/>
-          </a:p>
-          <a:p>
-            <a:r>
-              <a:rPr lang="en-US" dirty="0" err="1"/>
-              <a:t>Rgot</a:t>
-            </a:r>
-            <a:r>
-              <a:rPr lang="en-US" baseline="0" dirty="0"/>
-              <a:t> notes from Richard lock</a:t>
-            </a:r>
             <a:endParaRPr lang="en-US" dirty="0"/>
           </a:p>
         </p:txBody>
@@ -1574,7 +1558,7 @@
             <a:fld id="{87DE6118-2437-4B30-8E3C-4D2BE6020583}" type="datetimeFigureOut">
               <a:rPr lang="en-US" dirty="0"/>
               <a:pPr/>
-              <a:t>6/5/2018</a:t>
+              <a:t>6/6/2018</a:t>
             </a:fld>
             <a:endParaRPr lang="en-US" dirty="0"/>
           </a:p>
@@ -1900,7 +1884,7 @@
           <a:p>
             <a:fld id="{87DE6118-2437-4B30-8E3C-4D2BE6020583}" type="datetimeFigureOut">
               <a:rPr lang="en-US" dirty="0"/>
-              <a:t>6/5/2018</a:t>
+              <a:t>6/6/2018</a:t>
             </a:fld>
             <a:endParaRPr lang="en-US" dirty="0"/>
           </a:p>
@@ -2075,7 +2059,7 @@
           <a:p>
             <a:fld id="{87DE6118-2437-4B30-8E3C-4D2BE6020583}" type="datetimeFigureOut">
               <a:rPr lang="en-US" dirty="0"/>
-              <a:t>6/5/2018</a:t>
+              <a:t>6/6/2018</a:t>
             </a:fld>
             <a:endParaRPr lang="en-US" dirty="0"/>
           </a:p>
@@ -2240,7 +2224,7 @@
           <a:p>
             <a:fld id="{87DE6118-2437-4B30-8E3C-4D2BE6020583}" type="datetimeFigureOut">
               <a:rPr lang="en-US" dirty="0"/>
-              <a:t>6/5/2018</a:t>
+              <a:t>6/6/2018</a:t>
             </a:fld>
             <a:endParaRPr lang="en-US" dirty="0"/>
           </a:p>
@@ -2513,7 +2497,7 @@
             <a:fld id="{87DE6118-2437-4B30-8E3C-4D2BE6020583}" type="datetimeFigureOut">
               <a:rPr lang="en-US" dirty="0"/>
               <a:pPr/>
-              <a:t>6/5/2018</a:t>
+              <a:t>6/6/2018</a:t>
             </a:fld>
             <a:endParaRPr lang="en-US" dirty="0"/>
           </a:p>
@@ -2903,7 +2887,7 @@
           <a:p>
             <a:fld id="{87DE6118-2437-4B30-8E3C-4D2BE6020583}" type="datetimeFigureOut">
               <a:rPr lang="en-US" dirty="0"/>
-              <a:t>6/5/2018</a:t>
+              <a:t>6/6/2018</a:t>
             </a:fld>
             <a:endParaRPr lang="en-US" dirty="0"/>
           </a:p>
@@ -3375,7 +3359,7 @@
           <a:p>
             <a:fld id="{87DE6118-2437-4B30-8E3C-4D2BE6020583}" type="datetimeFigureOut">
               <a:rPr lang="en-US" dirty="0"/>
-              <a:t>6/5/2018</a:t>
+              <a:t>6/6/2018</a:t>
             </a:fld>
             <a:endParaRPr lang="en-US" dirty="0"/>
           </a:p>
@@ -3488,7 +3472,7 @@
           <a:p>
             <a:fld id="{87DE6118-2437-4B30-8E3C-4D2BE6020583}" type="datetimeFigureOut">
               <a:rPr lang="en-US" dirty="0"/>
-              <a:t>6/5/2018</a:t>
+              <a:t>6/6/2018</a:t>
             </a:fld>
             <a:endParaRPr lang="en-US" dirty="0"/>
           </a:p>
@@ -3578,7 +3562,7 @@
           <a:p>
             <a:fld id="{87DE6118-2437-4B30-8E3C-4D2BE6020583}" type="datetimeFigureOut">
               <a:rPr lang="en-US" dirty="0"/>
-              <a:t>6/5/2018</a:t>
+              <a:t>6/6/2018</a:t>
             </a:fld>
             <a:endParaRPr lang="en-US" dirty="0"/>
           </a:p>
@@ -3920,7 +3904,7 @@
             <a:fld id="{87DE6118-2437-4B30-8E3C-4D2BE6020583}" type="datetimeFigureOut">
               <a:rPr lang="en-US" dirty="0"/>
               <a:pPr/>
-              <a:t>6/5/2018</a:t>
+              <a:t>6/6/2018</a:t>
             </a:fld>
             <a:endParaRPr lang="en-US" dirty="0"/>
           </a:p>
@@ -4305,7 +4289,7 @@
             <a:fld id="{87DE6118-2437-4B30-8E3C-4D2BE6020583}" type="datetimeFigureOut">
               <a:rPr lang="en-US" dirty="0"/>
               <a:pPr/>
-              <a:t>6/5/2018</a:t>
+              <a:t>6/6/2018</a:t>
             </a:fld>
             <a:endParaRPr lang="en-US" dirty="0"/>
           </a:p>
@@ -4580,7 +4564,7 @@
             <a:fld id="{87DE6118-2437-4B30-8E3C-4D2BE6020583}" type="datetimeFigureOut">
               <a:rPr lang="en-US" dirty="0"/>
               <a:pPr/>
-              <a:t>6/5/2018</a:t>
+              <a:t>6/6/2018</a:t>
             </a:fld>
             <a:endParaRPr lang="en-US" dirty="0"/>
           </a:p>
@@ -6328,6 +6312,195 @@
   <p:clrMapOvr>
     <a:masterClrMapping/>
   </p:clrMapOvr>
+  <p:timing>
+    <p:tnLst>
+      <p:par>
+        <p:cTn id="1" dur="indefinite" restart="never" nodeType="tmRoot">
+          <p:childTnLst>
+            <p:seq concurrent="1" nextAc="seek">
+              <p:cTn id="2" dur="indefinite" nodeType="mainSeq">
+                <p:childTnLst>
+                  <p:par>
+                    <p:cTn id="3" fill="hold">
+                      <p:stCondLst>
+                        <p:cond delay="indefinite"/>
+                      </p:stCondLst>
+                      <p:childTnLst>
+                        <p:par>
+                          <p:cTn id="4" fill="hold">
+                            <p:stCondLst>
+                              <p:cond delay="0"/>
+                            </p:stCondLst>
+                            <p:childTnLst>
+                              <p:par>
+                                <p:cTn id="5" presetID="10" presetClass="entr" presetSubtype="0" fill="hold" nodeType="clickEffect">
+                                  <p:stCondLst>
+                                    <p:cond delay="0"/>
+                                  </p:stCondLst>
+                                  <p:childTnLst>
+                                    <p:set>
+                                      <p:cBhvr>
+                                        <p:cTn id="6" dur="1" fill="hold">
+                                          <p:stCondLst>
+                                            <p:cond delay="0"/>
+                                          </p:stCondLst>
+                                        </p:cTn>
+                                        <p:tgtEl>
+                                          <p:spTgt spid="8"/>
+                                        </p:tgtEl>
+                                        <p:attrNameLst>
+                                          <p:attrName>style.visibility</p:attrName>
+                                        </p:attrNameLst>
+                                      </p:cBhvr>
+                                      <p:to>
+                                        <p:strVal val="visible"/>
+                                      </p:to>
+                                    </p:set>
+                                    <p:animEffect transition="in" filter="fade">
+                                      <p:cBhvr>
+                                        <p:cTn id="7" dur="500"/>
+                                        <p:tgtEl>
+                                          <p:spTgt spid="8"/>
+                                        </p:tgtEl>
+                                      </p:cBhvr>
+                                    </p:animEffect>
+                                  </p:childTnLst>
+                                </p:cTn>
+                              </p:par>
+                            </p:childTnLst>
+                          </p:cTn>
+                        </p:par>
+                      </p:childTnLst>
+                    </p:cTn>
+                  </p:par>
+                  <p:par>
+                    <p:cTn id="8" fill="hold">
+                      <p:stCondLst>
+                        <p:cond delay="indefinite"/>
+                      </p:stCondLst>
+                      <p:childTnLst>
+                        <p:par>
+                          <p:cTn id="9" fill="hold">
+                            <p:stCondLst>
+                              <p:cond delay="0"/>
+                            </p:stCondLst>
+                            <p:childTnLst>
+                              <p:par>
+                                <p:cTn id="10" presetID="10" presetClass="entr" presetSubtype="0" fill="hold" nodeType="clickEffect">
+                                  <p:stCondLst>
+                                    <p:cond delay="0"/>
+                                  </p:stCondLst>
+                                  <p:childTnLst>
+                                    <p:set>
+                                      <p:cBhvr>
+                                        <p:cTn id="11" dur="1" fill="hold">
+                                          <p:stCondLst>
+                                            <p:cond delay="0"/>
+                                          </p:stCondLst>
+                                        </p:cTn>
+                                        <p:tgtEl>
+                                          <p:spTgt spid="1030"/>
+                                        </p:tgtEl>
+                                        <p:attrNameLst>
+                                          <p:attrName>style.visibility</p:attrName>
+                                        </p:attrNameLst>
+                                      </p:cBhvr>
+                                      <p:to>
+                                        <p:strVal val="visible"/>
+                                      </p:to>
+                                    </p:set>
+                                    <p:animEffect transition="in" filter="fade">
+                                      <p:cBhvr>
+                                        <p:cTn id="12" dur="500"/>
+                                        <p:tgtEl>
+                                          <p:spTgt spid="1030"/>
+                                        </p:tgtEl>
+                                      </p:cBhvr>
+                                    </p:animEffect>
+                                  </p:childTnLst>
+                                </p:cTn>
+                              </p:par>
+                            </p:childTnLst>
+                          </p:cTn>
+                        </p:par>
+                      </p:childTnLst>
+                    </p:cTn>
+                  </p:par>
+                  <p:par>
+                    <p:cTn id="13" fill="hold">
+                      <p:stCondLst>
+                        <p:cond delay="indefinite"/>
+                      </p:stCondLst>
+                      <p:childTnLst>
+                        <p:par>
+                          <p:cTn id="14" fill="hold">
+                            <p:stCondLst>
+                              <p:cond delay="0"/>
+                            </p:stCondLst>
+                            <p:childTnLst>
+                              <p:par>
+                                <p:cTn id="15" presetID="10" presetClass="entr" presetSubtype="0" fill="hold" nodeType="clickEffect">
+                                  <p:stCondLst>
+                                    <p:cond delay="0"/>
+                                  </p:stCondLst>
+                                  <p:childTnLst>
+                                    <p:set>
+                                      <p:cBhvr>
+                                        <p:cTn id="16" dur="1" fill="hold">
+                                          <p:stCondLst>
+                                            <p:cond delay="0"/>
+                                          </p:stCondLst>
+                                        </p:cTn>
+                                        <p:tgtEl>
+                                          <p:spTgt spid="1028"/>
+                                        </p:tgtEl>
+                                        <p:attrNameLst>
+                                          <p:attrName>style.visibility</p:attrName>
+                                        </p:attrNameLst>
+                                      </p:cBhvr>
+                                      <p:to>
+                                        <p:strVal val="visible"/>
+                                      </p:to>
+                                    </p:set>
+                                    <p:animEffect transition="in" filter="fade">
+                                      <p:cBhvr>
+                                        <p:cTn id="17" dur="500"/>
+                                        <p:tgtEl>
+                                          <p:spTgt spid="1028"/>
+                                        </p:tgtEl>
+                                      </p:cBhvr>
+                                    </p:animEffect>
+                                  </p:childTnLst>
+                                </p:cTn>
+                              </p:par>
+                            </p:childTnLst>
+                          </p:cTn>
+                        </p:par>
+                      </p:childTnLst>
+                    </p:cTn>
+                  </p:par>
+                </p:childTnLst>
+              </p:cTn>
+              <p:prevCondLst>
+                <p:cond evt="onPrev" delay="0">
+                  <p:tgtEl>
+                    <p:sldTgt/>
+                  </p:tgtEl>
+                </p:cond>
+              </p:prevCondLst>
+              <p:nextCondLst>
+                <p:cond evt="onNext" delay="0">
+                  <p:tgtEl>
+                    <p:sldTgt/>
+                  </p:tgtEl>
+                </p:cond>
+              </p:nextCondLst>
+            </p:seq>
+          </p:childTnLst>
+        </p:cTn>
+      </p:par>
+    </p:tnLst>
+  </p:timing>
 </p:sld>
 </file>
 
@@ -6371,7 +6544,7 @@
           <a:p>
             <a:r>
               <a:rPr lang="en-US" dirty="0"/>
-              <a:t>Is Grid ready for prime time?</a:t>
+              <a:t>Is CSS Grid ready for prime time?</a:t>
             </a:r>
           </a:p>
         </p:txBody>
@@ -6623,7 +6796,7 @@
               <a:rPr lang="en-US" dirty="0">
                 <a:hlinkClick r:id="rId4"/>
               </a:rPr>
-              <a:t>https://gridbyexample.com/</a:t>
+              <a:t>https://css-tricks.com/snippets/css/complete-guide-grid/</a:t>
             </a:r>
             <a:endParaRPr lang="en-US" dirty="0"/>
           </a:p>
@@ -6632,16 +6805,16 @@
               <a:rPr lang="en-US" dirty="0">
                 <a:hlinkClick r:id="rId5"/>
               </a:rPr>
-              <a:t>https://css-tricks.com/snippets/css/complete-guide-grid/</a:t>
+              <a:t>https://gridbyexample.com/</a:t>
             </a:r>
             <a:endParaRPr lang="en-US" dirty="0"/>
           </a:p>
           <a:p>
             <a:r>
-              <a:rPr lang="en-US" dirty="0">
+              <a:rPr lang="en-US" u="sng" dirty="0">
                 <a:hlinkClick r:id="rId6"/>
               </a:rPr>
-              <a:t>http://cssgridgarden.com/</a:t>
+              <a:t>https://labs.jensimmons.com/</a:t>
             </a:r>
             <a:endParaRPr lang="en-US" dirty="0"/>
           </a:p>
@@ -6650,21 +6823,8 @@
               <a:rPr lang="en-US" dirty="0">
                 <a:hlinkClick r:id="rId7"/>
               </a:rPr>
-              <a:t>https://tutorialzine.com/2017/03/css-grid-vs-flexbox</a:t>
-            </a:r>
-          </a:p>
-          <a:p>
-            <a:r>
-              <a:rPr lang="en-US" dirty="0">
-                <a:hlinkClick r:id="rId7"/>
-              </a:rPr>
-              <a:t>http://bit.ly/css-grid-nebr-code</a:t>
-            </a:r>
-          </a:p>
-          <a:p>
-            <a:endParaRPr lang="en-US" dirty="0"/>
-          </a:p>
-          <a:p>
+              <a:t>http://cssgridgarden.com/</a:t>
+            </a:r>
             <a:endParaRPr lang="en-US" dirty="0"/>
           </a:p>
         </p:txBody>
@@ -6801,6 +6961,66 @@
       </p:transition>
     </mc:Fallback>
   </mc:AlternateContent>
+</p:sld>
+</file>
+
+<file path=ppt/slides/slide8.xml><?xml version="1.0" encoding="utf-8"?>
+<p:sld xmlns:a="http://schemas.openxmlformats.org/drawingml/2006/main" xmlns:r="http://schemas.openxmlformats.org/officeDocument/2006/relationships" xmlns:p="http://schemas.openxmlformats.org/presentationml/2006/main">
+  <p:cSld>
+    <p:spTree>
+      <p:nvGrpSpPr>
+        <p:cNvPr id="1" name=""/>
+        <p:cNvGrpSpPr/>
+        <p:nvPr/>
+      </p:nvGrpSpPr>
+      <p:grpSpPr>
+        <a:xfrm>
+          <a:off x="0" y="0"/>
+          <a:ext cx="0" cy="0"/>
+          <a:chOff x="0" y="0"/>
+          <a:chExt cx="0" cy="0"/>
+        </a:xfrm>
+      </p:grpSpPr>
+      <p:pic>
+        <p:nvPicPr>
+          <p:cNvPr id="8" name="Picture 7">
+            <a:extLst>
+              <a:ext uri="{FF2B5EF4-FFF2-40B4-BE49-F238E27FC236}">
+                <a16:creationId xmlns:a16="http://schemas.microsoft.com/office/drawing/2014/main" id="{7E9CB2A8-8CE4-48C8-A6BE-29774F7BB68A}"/>
+              </a:ext>
+            </a:extLst>
+          </p:cNvPr>
+          <p:cNvPicPr>
+            <a:picLocks noChangeAspect="1"/>
+          </p:cNvPicPr>
+          <p:nvPr/>
+        </p:nvPicPr>
+        <p:blipFill>
+          <a:blip r:embed="rId2"/>
+          <a:stretch>
+            <a:fillRect/>
+          </a:stretch>
+        </p:blipFill>
+        <p:spPr>
+          <a:xfrm>
+            <a:off x="4662" y="0"/>
+            <a:ext cx="12182676" cy="6858000"/>
+          </a:xfrm>
+          <a:prstGeom prst="rect">
+            <a:avLst/>
+          </a:prstGeom>
+        </p:spPr>
+      </p:pic>
+    </p:spTree>
+    <p:extLst>
+      <p:ext uri="{BB962C8B-B14F-4D97-AF65-F5344CB8AC3E}">
+        <p14:creationId xmlns:p14="http://schemas.microsoft.com/office/powerpoint/2010/main" val="2667841962"/>
+      </p:ext>
+    </p:extLst>
+  </p:cSld>
+  <p:clrMapOvr>
+    <a:masterClrMapping/>
+  </p:clrMapOvr>
 </p:sld>
 </file>
 

</xml_diff>